<commit_message>
Minor updates to presentation
</commit_message>
<xml_diff>
--- a/Contract-testing-presentation_EngineersWeek.pptx
+++ b/Contract-testing-presentation_EngineersWeek.pptx
@@ -263,7 +263,7 @@
           <a:p>
             <a:fld id="{285797F7-B584-2444-A80B-4076733C4FE4}" type="datetimeFigureOut">
               <a:rPr lang="en-NL" smtClean="0"/>
-              <a:t>06/10/2021</a:t>
+              <a:t>12/10/2021</a:t>
             </a:fld>
             <a:endParaRPr lang="en-NL"/>
           </a:p>
@@ -680,7 +680,7 @@
           <a:p>
             <a:fld id="{3C37AEF4-060C-854E-8FDF-5C41AB4533DB}" type="datetime1">
               <a:rPr lang="en-US" smtClean="0"/>
-              <a:t>10/6/21</a:t>
+              <a:t>10/12/21</a:t>
             </a:fld>
             <a:endParaRPr lang="en-NL"/>
           </a:p>
@@ -884,7 +884,7 @@
           <a:p>
             <a:fld id="{73BCE042-14E1-244D-A30D-BADB56A81442}" type="datetime1">
               <a:rPr lang="en-US" smtClean="0"/>
-              <a:t>10/6/21</a:t>
+              <a:t>10/12/21</a:t>
             </a:fld>
             <a:endParaRPr lang="en-NL"/>
           </a:p>
@@ -1098,7 +1098,7 @@
           <a:p>
             <a:fld id="{9F633E64-6E9A-FB44-96F4-C55051F0BC4D}" type="datetime1">
               <a:rPr lang="en-US" smtClean="0"/>
-              <a:t>10/6/21</a:t>
+              <a:t>10/12/21</a:t>
             </a:fld>
             <a:endParaRPr lang="en-NL"/>
           </a:p>
@@ -1302,7 +1302,7 @@
           <a:p>
             <a:fld id="{29B78103-61BA-1240-A296-FC5C86EAAFE8}" type="datetime1">
               <a:rPr lang="en-US" smtClean="0"/>
-              <a:t>10/6/21</a:t>
+              <a:t>10/12/21</a:t>
             </a:fld>
             <a:endParaRPr lang="en-NL"/>
           </a:p>
@@ -1582,7 +1582,7 @@
           <a:p>
             <a:fld id="{F2525007-2717-6544-B03C-3548708617FB}" type="datetime1">
               <a:rPr lang="en-US" smtClean="0"/>
-              <a:t>10/6/21</a:t>
+              <a:t>10/12/21</a:t>
             </a:fld>
             <a:endParaRPr lang="en-NL"/>
           </a:p>
@@ -1854,7 +1854,7 @@
           <a:p>
             <a:fld id="{66A9A406-F410-A943-9B5D-B422183285DC}" type="datetime1">
               <a:rPr lang="en-US" smtClean="0"/>
-              <a:t>10/6/21</a:t>
+              <a:t>10/12/21</a:t>
             </a:fld>
             <a:endParaRPr lang="en-NL"/>
           </a:p>
@@ -2273,7 +2273,7 @@
           <a:p>
             <a:fld id="{D563F7DA-D5B0-EA4C-8C76-C1BE135C1018}" type="datetime1">
               <a:rPr lang="en-US" smtClean="0"/>
-              <a:t>10/6/21</a:t>
+              <a:t>10/12/21</a:t>
             </a:fld>
             <a:endParaRPr lang="en-NL"/>
           </a:p>
@@ -2419,7 +2419,7 @@
           <a:p>
             <a:fld id="{BA66445F-081C-534F-BFE3-77387421BF66}" type="datetime1">
               <a:rPr lang="en-US" smtClean="0"/>
-              <a:t>10/6/21</a:t>
+              <a:t>10/12/21</a:t>
             </a:fld>
             <a:endParaRPr lang="en-NL"/>
           </a:p>
@@ -2536,7 +2536,7 @@
           <a:p>
             <a:fld id="{3925D451-3E69-D243-9CA2-1564179F5018}" type="datetime1">
               <a:rPr lang="en-US" smtClean="0"/>
-              <a:t>10/6/21</a:t>
+              <a:t>10/12/21</a:t>
             </a:fld>
             <a:endParaRPr lang="en-NL"/>
           </a:p>
@@ -2853,7 +2853,7 @@
           <a:p>
             <a:fld id="{0D9CC3B1-E967-0747-9F8D-A6CDC492B6AA}" type="datetime1">
               <a:rPr lang="en-US" smtClean="0"/>
-              <a:t>10/6/21</a:t>
+              <a:t>10/12/21</a:t>
             </a:fld>
             <a:endParaRPr lang="en-NL"/>
           </a:p>
@@ -3146,7 +3146,7 @@
           <a:p>
             <a:fld id="{ACA566DA-EAFF-8645-889D-77625A88D91D}" type="datetime1">
               <a:rPr lang="en-US" smtClean="0"/>
-              <a:t>10/6/21</a:t>
+              <a:t>10/12/21</a:t>
             </a:fld>
             <a:endParaRPr lang="en-NL"/>
           </a:p>
@@ -3393,7 +3393,7 @@
           <a:p>
             <a:fld id="{A5CC36B8-08FA-1C47-B260-42099A1286CB}" type="datetime1">
               <a:rPr lang="en-US" smtClean="0"/>
-              <a:t>10/6/21</a:t>
+              <a:t>10/12/21</a:t>
             </a:fld>
             <a:endParaRPr lang="en-NL"/>
           </a:p>
@@ -5378,7 +5378,7 @@
             </a:pPr>
             <a:r>
               <a:rPr lang="en-GB" dirty="0"/>
-              <a:t>Links with more detail of what these do can be found at the end of the presentation</a:t>
+              <a:t>I will cover these later</a:t>
             </a:r>
           </a:p>
           <a:p>
@@ -7076,7 +7076,7 @@
                   <a:srgbClr val="1822C0"/>
                 </a:solidFill>
               </a:rPr>
-              <a:t>Overview of the 2 micro-services in GitHub</a:t>
+              <a:t>Overview of our 2 micro-services in GitHub</a:t>
             </a:r>
             <a:endParaRPr lang="en-NL" dirty="0">
               <a:solidFill>
@@ -10628,7 +10628,7 @@
                   <a:srgbClr val="1822C0"/>
                 </a:solidFill>
               </a:rPr>
-              <a:t>Remember the stubs.jar file in the provider? </a:t>
+              <a:t>Remember the stubs.jar file in the Provider? </a:t>
             </a:r>
           </a:p>
         </p:txBody>
@@ -10660,19 +10660,13 @@
           <a:p>
             <a:r>
               <a:rPr lang="en-NL" sz="3700" dirty="0"/>
-              <a:t>The generated stubs.jar file for the provider is key to everything</a:t>
+              <a:t>stubs.jar is generated every time we do a build.  It is key to everything</a:t>
             </a:r>
           </a:p>
           <a:p>
             <a:r>
               <a:rPr lang="en-NL" sz="3700" dirty="0"/>
               <a:t>It can be stored in Nexus, local Maven repo, Azure, Git, etc</a:t>
-            </a:r>
-          </a:p>
-          <a:p>
-            <a:r>
-              <a:rPr lang="en-NL" sz="3700" dirty="0"/>
-              <a:t>It contains WireMock mappings files that were generated during the build</a:t>
             </a:r>
           </a:p>
           <a:p>
@@ -10902,7 +10896,7 @@
         </p:nvGrpSpPr>
         <p:grpSpPr>
           <a:xfrm>
-            <a:off x="1259283" y="5046903"/>
+            <a:off x="1242658" y="4722707"/>
             <a:ext cx="8171277" cy="1303694"/>
             <a:chOff x="1380227" y="4001294"/>
             <a:chExt cx="8171277" cy="1303694"/>
@@ -11626,7 +11620,7 @@
           <a:p>
             <a:r>
               <a:rPr lang="en-NL" sz="2400" dirty="0"/>
-              <a:t>Base classes are used to help build and run Junit verification tests</a:t>
+              <a:t>Base classes are used to build and run Junit verification tests for the contracts</a:t>
             </a:r>
           </a:p>
           <a:p>
@@ -12834,7 +12828,21 @@
                 <a:latin typeface="Cordia New" panose="020B0304020202020204" pitchFamily="34" charset="-34"/>
                 <a:cs typeface="Cordia New" panose="020B0304020202020204" pitchFamily="34" charset="-34"/>
               </a:rPr>
-              <a:t>This uses the following annotation to download and run the stubs jar file from the specified repository</a:t>
+              <a:t>This uses the following </a:t>
+            </a:r>
+            <a:r>
+              <a:rPr lang="en-NL" sz="2400" b="1" dirty="0">
+                <a:latin typeface="Cordia New" panose="020B0304020202020204" pitchFamily="34" charset="-34"/>
+                <a:cs typeface="Cordia New" panose="020B0304020202020204" pitchFamily="34" charset="-34"/>
+              </a:rPr>
+              <a:t>StubRunner</a:t>
+            </a:r>
+            <a:r>
+              <a:rPr lang="en-NL" sz="2400" dirty="0">
+                <a:latin typeface="Cordia New" panose="020B0304020202020204" pitchFamily="34" charset="-34"/>
+                <a:cs typeface="Cordia New" panose="020B0304020202020204" pitchFamily="34" charset="-34"/>
+              </a:rPr>
+              <a:t> annotation to download and run the stubs jar file from the specified repository</a:t>
             </a:r>
           </a:p>
           <a:p>
@@ -14640,7 +14648,7 @@
                   <a:srgbClr val="1822C0"/>
                 </a:solidFill>
               </a:rPr>
-              <a:t>Hi Yo Silver! To the consumer code we go!</a:t>
+              <a:t>Hi Yo Silver! To the integration tests we go!</a:t>
             </a:r>
             <a:endParaRPr lang="en-NL" dirty="0">
               <a:solidFill>
@@ -15001,7 +15009,7 @@
                 <a:latin typeface="Cordia New" panose="020B0304020202020204" pitchFamily="34" charset="-34"/>
                 <a:cs typeface="Cordia New" panose="020B0304020202020204" pitchFamily="34" charset="-34"/>
               </a:rPr>
-              <a:t>integration</a:t>
+              <a:t>consumerIntegration</a:t>
             </a:r>
             <a:r>
               <a:rPr lang="en-GB" sz="2400" dirty="0">
@@ -17722,7 +17730,7 @@
         </p:blipFill>
         <p:spPr>
           <a:xfrm>
-            <a:off x="1017104" y="2559707"/>
+            <a:off x="1225334" y="2397907"/>
             <a:ext cx="914400" cy="914400"/>
           </a:xfrm>
           <a:prstGeom prst="rect">
@@ -17744,8 +17752,8 @@
         </p:nvSpPr>
         <p:spPr>
           <a:xfrm>
-            <a:off x="1103243" y="3836504"/>
-            <a:ext cx="834780" cy="369332"/>
+            <a:off x="443946" y="3446739"/>
+            <a:ext cx="2434128" cy="646331"/>
           </a:xfrm>
           <a:prstGeom prst="rect">
             <a:avLst/>
@@ -17758,9 +17766,17 @@
           </a:bodyPr>
           <a:lstStyle/>
           <a:p>
+            <a:pPr algn="ctr"/>
             <a:r>
               <a:rPr lang="en-NL"/>
               <a:t>Testers</a:t>
+            </a:r>
+          </a:p>
+          <a:p>
+            <a:pPr algn="ctr"/>
+            <a:r>
+              <a:rPr lang="en-NL"/>
+              <a:t>(performance tests, etc)</a:t>
             </a:r>
           </a:p>
         </p:txBody>
@@ -18143,7 +18159,7 @@
                 </a:solidFill>
                 <a:latin typeface="Courier" pitchFamily="2" charset="0"/>
               </a:rPr>
-              <a:t>consumer and provider</a:t>
+              <a:t>Note: consumer and provider are responsible for generating the above jar files</a:t>
             </a:r>
           </a:p>
           <a:p>
@@ -18339,7 +18355,7 @@
           <a:p>
             <a:r>
               <a:rPr lang="en-NL" sz="2400" dirty="0"/>
-              <a:t>Use good naming conventions</a:t>
+              <a:t>Use good naming conventions!!</a:t>
             </a:r>
           </a:p>
           <a:p>
@@ -19543,7 +19559,7 @@
           <a:p>
             <a:r>
               <a:rPr lang="en-NL" dirty="0"/>
-              <a:t>This repo also contains a README and this presentation</a:t>
+              <a:t>This repo also contains README files, and this presentation</a:t>
             </a:r>
             <a:br>
               <a:rPr lang="en-NL" dirty="0"/>
@@ -22064,7 +22080,7 @@
           <a:p>
             <a:r>
               <a:rPr lang="en-GB" sz="2400" dirty="0"/>
-              <a:t>The contracts tests will run automatically when building the code</a:t>
+              <a:t>In fact, the contracts tests will run automatically when building the code</a:t>
             </a:r>
             <a:br>
               <a:rPr lang="en-GB" sz="2400" dirty="0"/>
@@ -22074,7 +22090,7 @@
           <a:p>
             <a:r>
               <a:rPr lang="en-GB" sz="2400" dirty="0"/>
-              <a:t>The build can be run locally or in a pipeline – it makes no difference to the tests</a:t>
+              <a:t>We do not need any external stub applications, databases, etc</a:t>
             </a:r>
             <a:br>
               <a:rPr lang="en-GB" sz="2400" dirty="0"/>

</xml_diff>

<commit_message>
Minor updates to presentation and README
</commit_message>
<xml_diff>
--- a/Contract-testing-presentation_EngineersWeek.pptx
+++ b/Contract-testing-presentation_EngineersWeek.pptx
@@ -11435,6 +11435,13 @@
             <a:r>
               <a:rPr lang="en-NL" dirty="0"/>
               <a:t> - builds the stubs jar file directly</a:t>
+            </a:r>
+            <a:br>
+              <a:rPr lang="en-NL" dirty="0"/>
+            </a:br>
+            <a:r>
+              <a:rPr lang="en-NL" dirty="0"/>
+              <a:t> - does not generate the contract Junit tests</a:t>
             </a:r>
             <a:br>
               <a:rPr lang="en-NL" dirty="0"/>

</xml_diff>

<commit_message>
Minor changes to PPT for engineer guild
</commit_message>
<xml_diff>
--- a/Contract-testing-presentation_EngineersWeek.pptx
+++ b/Contract-testing-presentation_EngineersWeek.pptx
@@ -3982,7 +3982,7 @@
                   <a:srgbClr val="1822C0"/>
                 </a:solidFill>
               </a:rPr>
-              <a:t>A bit of jargon - Consumer-driven testing</a:t>
+              <a:t>A bit of jargon - Provider-driven testing</a:t>
             </a:r>
           </a:p>
         </p:txBody>
@@ -11404,7 +11404,15 @@
             </a:br>
             <a:r>
               <a:rPr lang="en-NL" dirty="0"/>
-              <a:t> - generates and runs Junit tests to verify the consistency of the tests</a:t>
+              <a:t> - generates and runs Junit tests to </a:t>
+            </a:r>
+            <a:r>
+              <a:rPr lang="en-NL" b="1" dirty="0"/>
+              <a:t>verify</a:t>
+            </a:r>
+            <a:r>
+              <a:rPr lang="en-NL" dirty="0"/>
+              <a:t> the consistency of the tests</a:t>
             </a:r>
             <a:br>
               <a:rPr lang="en-NL" dirty="0"/>

</xml_diff>